<commit_message>
sauvegarde milieu travail PPT
</commit_message>
<xml_diff>
--- a/01-Maquettes Primitives/refroidissement_res/Evaluation refroidissement banc BASTIE.pptx
+++ b/01-Maquettes Primitives/refroidissement_res/Evaluation refroidissement banc BASTIE.pptx
@@ -252,7 +252,7 @@
           <a:p>
             <a:fld id="{173DD0CE-C943-4E21-BC7B-7FB34C449DF0}" type="datetimeFigureOut">
               <a:rPr lang="fr-FR" smtClean="0"/>
-              <a:t>15/10/2020</a:t>
+              <a:t>20/10/2020</a:t>
             </a:fld>
             <a:endParaRPr lang="fr-FR"/>
           </a:p>
@@ -422,7 +422,7 @@
           <a:p>
             <a:fld id="{173DD0CE-C943-4E21-BC7B-7FB34C449DF0}" type="datetimeFigureOut">
               <a:rPr lang="fr-FR" smtClean="0"/>
-              <a:t>15/10/2020</a:t>
+              <a:t>20/10/2020</a:t>
             </a:fld>
             <a:endParaRPr lang="fr-FR"/>
           </a:p>
@@ -602,7 +602,7 @@
           <a:p>
             <a:fld id="{173DD0CE-C943-4E21-BC7B-7FB34C449DF0}" type="datetimeFigureOut">
               <a:rPr lang="fr-FR" smtClean="0"/>
-              <a:t>15/10/2020</a:t>
+              <a:t>20/10/2020</a:t>
             </a:fld>
             <a:endParaRPr lang="fr-FR"/>
           </a:p>
@@ -772,7 +772,7 @@
           <a:p>
             <a:fld id="{173DD0CE-C943-4E21-BC7B-7FB34C449DF0}" type="datetimeFigureOut">
               <a:rPr lang="fr-FR" smtClean="0"/>
-              <a:t>15/10/2020</a:t>
+              <a:t>20/10/2020</a:t>
             </a:fld>
             <a:endParaRPr lang="fr-FR"/>
           </a:p>
@@ -1016,7 +1016,7 @@
           <a:p>
             <a:fld id="{173DD0CE-C943-4E21-BC7B-7FB34C449DF0}" type="datetimeFigureOut">
               <a:rPr lang="fr-FR" smtClean="0"/>
-              <a:t>15/10/2020</a:t>
+              <a:t>20/10/2020</a:t>
             </a:fld>
             <a:endParaRPr lang="fr-FR"/>
           </a:p>
@@ -1248,7 +1248,7 @@
           <a:p>
             <a:fld id="{173DD0CE-C943-4E21-BC7B-7FB34C449DF0}" type="datetimeFigureOut">
               <a:rPr lang="fr-FR" smtClean="0"/>
-              <a:t>15/10/2020</a:t>
+              <a:t>20/10/2020</a:t>
             </a:fld>
             <a:endParaRPr lang="fr-FR"/>
           </a:p>
@@ -1615,7 +1615,7 @@
           <a:p>
             <a:fld id="{173DD0CE-C943-4E21-BC7B-7FB34C449DF0}" type="datetimeFigureOut">
               <a:rPr lang="fr-FR" smtClean="0"/>
-              <a:t>15/10/2020</a:t>
+              <a:t>20/10/2020</a:t>
             </a:fld>
             <a:endParaRPr lang="fr-FR"/>
           </a:p>
@@ -1733,7 +1733,7 @@
           <a:p>
             <a:fld id="{173DD0CE-C943-4E21-BC7B-7FB34C449DF0}" type="datetimeFigureOut">
               <a:rPr lang="fr-FR" smtClean="0"/>
-              <a:t>15/10/2020</a:t>
+              <a:t>20/10/2020</a:t>
             </a:fld>
             <a:endParaRPr lang="fr-FR"/>
           </a:p>
@@ -1828,7 +1828,7 @@
           <a:p>
             <a:fld id="{173DD0CE-C943-4E21-BC7B-7FB34C449DF0}" type="datetimeFigureOut">
               <a:rPr lang="fr-FR" smtClean="0"/>
-              <a:t>15/10/2020</a:t>
+              <a:t>20/10/2020</a:t>
             </a:fld>
             <a:endParaRPr lang="fr-FR"/>
           </a:p>
@@ -2105,7 +2105,7 @@
           <a:p>
             <a:fld id="{173DD0CE-C943-4E21-BC7B-7FB34C449DF0}" type="datetimeFigureOut">
               <a:rPr lang="fr-FR" smtClean="0"/>
-              <a:t>15/10/2020</a:t>
+              <a:t>20/10/2020</a:t>
             </a:fld>
             <a:endParaRPr lang="fr-FR"/>
           </a:p>
@@ -2362,7 +2362,7 @@
           <a:p>
             <a:fld id="{173DD0CE-C943-4E21-BC7B-7FB34C449DF0}" type="datetimeFigureOut">
               <a:rPr lang="fr-FR" smtClean="0"/>
-              <a:t>15/10/2020</a:t>
+              <a:t>20/10/2020</a:t>
             </a:fld>
             <a:endParaRPr lang="fr-FR"/>
           </a:p>
@@ -2575,7 +2575,7 @@
           <a:p>
             <a:fld id="{173DD0CE-C943-4E21-BC7B-7FB34C449DF0}" type="datetimeFigureOut">
               <a:rPr lang="fr-FR" smtClean="0"/>
-              <a:t>15/10/2020</a:t>
+              <a:t>20/10/2020</a:t>
             </a:fld>
             <a:endParaRPr lang="fr-FR"/>
           </a:p>
@@ -3134,6 +3134,60 @@
           </a:extLst>
         </p:spPr>
       </p:pic>
+      <p:sp>
+        <p:nvSpPr>
+          <p:cNvPr id="2" name="Titre 1">
+            <a:extLst>
+              <a:ext uri="{FF2B5EF4-FFF2-40B4-BE49-F238E27FC236}">
+                <a16:creationId xmlns:a16="http://schemas.microsoft.com/office/drawing/2014/main" id="{BC912759-B7BF-4C63-A6F8-16CB9382ED96}"/>
+              </a:ext>
+            </a:extLst>
+          </p:cNvPr>
+          <p:cNvSpPr txBox="1">
+            <a:spLocks/>
+          </p:cNvSpPr>
+          <p:nvPr/>
+        </p:nvSpPr>
+        <p:spPr>
+          <a:xfrm>
+            <a:off x="255494" y="191827"/>
+            <a:ext cx="7772400" cy="695679"/>
+          </a:xfrm>
+          <a:prstGeom prst="rect">
+            <a:avLst/>
+          </a:prstGeom>
+        </p:spPr>
+        <p:txBody>
+          <a:bodyPr>
+            <a:normAutofit fontScale="97500"/>
+          </a:bodyPr>
+          <a:lstStyle>
+            <a:lvl1pPr algn="l" defTabSz="914400" rtl="0" eaLnBrk="1" latinLnBrk="0" hangingPunct="1">
+              <a:lnSpc>
+                <a:spcPct val="90000"/>
+              </a:lnSpc>
+              <a:spcBef>
+                <a:spcPct val="0"/>
+              </a:spcBef>
+              <a:buNone/>
+              <a:defRPr sz="4400" kern="1200">
+                <a:solidFill>
+                  <a:schemeClr val="tx1"/>
+                </a:solidFill>
+                <a:latin typeface="+mj-lt"/>
+                <a:ea typeface="+mj-ea"/>
+                <a:cs typeface="+mj-cs"/>
+              </a:defRPr>
+            </a:lvl1pPr>
+          </a:lstStyle>
+          <a:p>
+            <a:r>
+              <a:rPr lang="fr-FR" dirty="0"/>
+              <a:t>Un type de ventilateur possible</a:t>
+            </a:r>
+          </a:p>
+        </p:txBody>
+      </p:sp>
     </p:spTree>
     <p:extLst>
       <p:ext uri="{BB962C8B-B14F-4D97-AF65-F5344CB8AC3E}">
@@ -3566,7 +3620,7 @@
           <a:p>
             <a:r>
               <a:rPr lang="fr-FR" sz="2500" dirty="0"/>
-              <a:t>Puissance optimale de 2kW par résistance </a:t>
+              <a:t>Puissance maximale de 2kW par résistance </a:t>
             </a:r>
           </a:p>
           <a:p>
@@ -3988,7 +4042,7 @@
         </p:spPr>
         <p:txBody>
           <a:bodyPr>
-            <a:normAutofit fontScale="75000" lnSpcReduction="20000"/>
+            <a:normAutofit fontScale="60000" lnSpcReduction="20000"/>
           </a:bodyPr>
           <a:lstStyle>
             <a:lvl1pPr algn="l" defTabSz="914400" rtl="0" eaLnBrk="1" latinLnBrk="0" hangingPunct="1">
@@ -4024,7 +4078,15 @@
             </a:r>
             <a:r>
               <a:rPr lang="fr-FR" dirty="0"/>
-              <a:t>W/m^2</a:t>
+              <a:t>W/m^2 (énorme selon les profs de </a:t>
+            </a:r>
+            <a:r>
+              <a:rPr lang="fr-FR" dirty="0" err="1"/>
+              <a:t>Fle</a:t>
+            </a:r>
+            <a:r>
+              <a:rPr lang="fr-FR" dirty="0"/>
+              <a:t>)</a:t>
             </a:r>
           </a:p>
         </p:txBody>
@@ -4168,7 +4230,7 @@
           <a:p>
             <a:r>
               <a:rPr lang="fr-FR" dirty="0"/>
-              <a:t>En dynamique à refroidissement 200W/m^2</a:t>
+              <a:t>En dynamique à refroidissement 5W/m^2</a:t>
             </a:r>
           </a:p>
         </p:txBody>
@@ -4295,10 +4357,10 @@
       </p:grpSpPr>
       <p:sp>
         <p:nvSpPr>
-          <p:cNvPr id="3" name="Titre 1">
+          <p:cNvPr id="2" name="Titre 1">
             <a:extLst>
               <a:ext uri="{FF2B5EF4-FFF2-40B4-BE49-F238E27FC236}">
-                <a16:creationId xmlns:a16="http://schemas.microsoft.com/office/drawing/2014/main" id="{FD289AC6-F7E8-46C7-A98A-297C6E7AA22E}"/>
+                <a16:creationId xmlns:a16="http://schemas.microsoft.com/office/drawing/2014/main" id="{E3AB5838-CA02-4F31-B350-894F957F51C0}"/>
               </a:ext>
             </a:extLst>
           </p:cNvPr>
@@ -4318,7 +4380,7 @@
         </p:spPr>
         <p:txBody>
           <a:bodyPr>
-            <a:normAutofit fontScale="97500"/>
+            <a:normAutofit fontScale="60000" lnSpcReduction="20000"/>
           </a:bodyPr>
           <a:lstStyle>
             <a:lvl1pPr algn="l" defTabSz="914400" rtl="0" eaLnBrk="1" latinLnBrk="0" hangingPunct="1">
@@ -4342,7 +4404,7 @@
           <a:p>
             <a:r>
               <a:rPr lang="fr-FR" dirty="0"/>
-              <a:t>En dynamique</a:t>
+              <a:t>En dynamique à refroidissement 5W/m^2 après 400 secondes</a:t>
             </a:r>
           </a:p>
         </p:txBody>

</xml_diff>

<commit_message>
MAJ diapo par VBR et TLS
</commit_message>
<xml_diff>
--- a/01-Maquettes Primitives/refroidissement_res/Evaluation refroidissement banc BASTIE.pptx
+++ b/01-Maquettes Primitives/refroidissement_res/Evaluation refroidissement banc BASTIE.pptx
@@ -255,7 +255,7 @@
           <a:p>
             <a:fld id="{173DD0CE-C943-4E21-BC7B-7FB34C449DF0}" type="datetimeFigureOut">
               <a:rPr lang="fr-FR" smtClean="0"/>
-              <a:t>20/10/2020</a:t>
+              <a:t>21/10/2020</a:t>
             </a:fld>
             <a:endParaRPr lang="fr-FR"/>
           </a:p>
@@ -425,7 +425,7 @@
           <a:p>
             <a:fld id="{173DD0CE-C943-4E21-BC7B-7FB34C449DF0}" type="datetimeFigureOut">
               <a:rPr lang="fr-FR" smtClean="0"/>
-              <a:t>20/10/2020</a:t>
+              <a:t>21/10/2020</a:t>
             </a:fld>
             <a:endParaRPr lang="fr-FR"/>
           </a:p>
@@ -605,7 +605,7 @@
           <a:p>
             <a:fld id="{173DD0CE-C943-4E21-BC7B-7FB34C449DF0}" type="datetimeFigureOut">
               <a:rPr lang="fr-FR" smtClean="0"/>
-              <a:t>20/10/2020</a:t>
+              <a:t>21/10/2020</a:t>
             </a:fld>
             <a:endParaRPr lang="fr-FR"/>
           </a:p>
@@ -775,7 +775,7 @@
           <a:p>
             <a:fld id="{173DD0CE-C943-4E21-BC7B-7FB34C449DF0}" type="datetimeFigureOut">
               <a:rPr lang="fr-FR" smtClean="0"/>
-              <a:t>20/10/2020</a:t>
+              <a:t>21/10/2020</a:t>
             </a:fld>
             <a:endParaRPr lang="fr-FR"/>
           </a:p>
@@ -1019,7 +1019,7 @@
           <a:p>
             <a:fld id="{173DD0CE-C943-4E21-BC7B-7FB34C449DF0}" type="datetimeFigureOut">
               <a:rPr lang="fr-FR" smtClean="0"/>
-              <a:t>20/10/2020</a:t>
+              <a:t>21/10/2020</a:t>
             </a:fld>
             <a:endParaRPr lang="fr-FR"/>
           </a:p>
@@ -1251,7 +1251,7 @@
           <a:p>
             <a:fld id="{173DD0CE-C943-4E21-BC7B-7FB34C449DF0}" type="datetimeFigureOut">
               <a:rPr lang="fr-FR" smtClean="0"/>
-              <a:t>20/10/2020</a:t>
+              <a:t>21/10/2020</a:t>
             </a:fld>
             <a:endParaRPr lang="fr-FR"/>
           </a:p>
@@ -1618,7 +1618,7 @@
           <a:p>
             <a:fld id="{173DD0CE-C943-4E21-BC7B-7FB34C449DF0}" type="datetimeFigureOut">
               <a:rPr lang="fr-FR" smtClean="0"/>
-              <a:t>20/10/2020</a:t>
+              <a:t>21/10/2020</a:t>
             </a:fld>
             <a:endParaRPr lang="fr-FR"/>
           </a:p>
@@ -1736,7 +1736,7 @@
           <a:p>
             <a:fld id="{173DD0CE-C943-4E21-BC7B-7FB34C449DF0}" type="datetimeFigureOut">
               <a:rPr lang="fr-FR" smtClean="0"/>
-              <a:t>20/10/2020</a:t>
+              <a:t>21/10/2020</a:t>
             </a:fld>
             <a:endParaRPr lang="fr-FR"/>
           </a:p>
@@ -1831,7 +1831,7 @@
           <a:p>
             <a:fld id="{173DD0CE-C943-4E21-BC7B-7FB34C449DF0}" type="datetimeFigureOut">
               <a:rPr lang="fr-FR" smtClean="0"/>
-              <a:t>20/10/2020</a:t>
+              <a:t>21/10/2020</a:t>
             </a:fld>
             <a:endParaRPr lang="fr-FR"/>
           </a:p>
@@ -2108,7 +2108,7 @@
           <a:p>
             <a:fld id="{173DD0CE-C943-4E21-BC7B-7FB34C449DF0}" type="datetimeFigureOut">
               <a:rPr lang="fr-FR" smtClean="0"/>
-              <a:t>20/10/2020</a:t>
+              <a:t>21/10/2020</a:t>
             </a:fld>
             <a:endParaRPr lang="fr-FR"/>
           </a:p>
@@ -2365,7 +2365,7 @@
           <a:p>
             <a:fld id="{173DD0CE-C943-4E21-BC7B-7FB34C449DF0}" type="datetimeFigureOut">
               <a:rPr lang="fr-FR" smtClean="0"/>
-              <a:t>20/10/2020</a:t>
+              <a:t>21/10/2020</a:t>
             </a:fld>
             <a:endParaRPr lang="fr-FR"/>
           </a:p>
@@ -2578,7 +2578,7 @@
           <a:p>
             <a:fld id="{173DD0CE-C943-4E21-BC7B-7FB34C449DF0}" type="datetimeFigureOut">
               <a:rPr lang="fr-FR" smtClean="0"/>
-              <a:t>20/10/2020</a:t>
+              <a:t>21/10/2020</a:t>
             </a:fld>
             <a:endParaRPr lang="fr-FR"/>
           </a:p>
@@ -4115,7 +4115,7 @@
           <a:p>
             <a:r>
               <a:rPr lang="fr-FR" sz="2500" dirty="0"/>
-              <a:t>Cylindre 510 mm avec diamètre 60mm =&gt; 1.44 e-3 m^3</a:t>
+              <a:t>Cylindre L. 510 mm x ɸ60mm =&gt; 1.44 e-3 m^3</a:t>
             </a:r>
           </a:p>
           <a:p>

</xml_diff>